<commit_message>
Added lab on subc
</commit_message>
<xml_diff>
--- a/units/unit01_basic_logic/basic_logic.pptx
+++ b/units/unit01_basic_logic/basic_logic.pptx
@@ -256,7 +256,7 @@
           <a:p>
             <a:fld id="{B7D6DDD3-D7E9-488B-B626-1E8285E424D8}" type="datetimeFigureOut">
               <a:rPr lang="en-US" smtClean="0"/>
-              <a:t>1/16/2026</a:t>
+              <a:t>1/19/2026</a:t>
             </a:fld>
             <a:endParaRPr lang="en-US"/>
           </a:p>
@@ -4826,8 +4826,8 @@
           </a:p>
         </p:txBody>
       </p:sp>
-      <mc:AlternateContent xmlns:mc="http://schemas.openxmlformats.org/markup-compatibility/2006">
-        <mc:Choice xmlns:a14="http://schemas.microsoft.com/office/drawing/2010/main" Requires="a14">
+      <mc:AlternateContent xmlns:mc="http://schemas.openxmlformats.org/markup-compatibility/2006" xmlns:a14="http://schemas.microsoft.com/office/drawing/2010/main">
+        <mc:Choice Requires="a14">
           <p:sp>
             <p:nvSpPr>
               <p:cNvPr id="3" name="Content Placeholder 2">
@@ -5025,7 +5025,7 @@
             </p:txBody>
           </p:sp>
         </mc:Choice>
-        <mc:Fallback>
+        <mc:Fallback xmlns="">
           <p:sp>
             <p:nvSpPr>
               <p:cNvPr id="3" name="Content Placeholder 2">
@@ -5207,8 +5207,8 @@
           </a:p>
         </p:txBody>
       </p:sp>
-      <mc:AlternateContent xmlns:mc="http://schemas.openxmlformats.org/markup-compatibility/2006">
-        <mc:Choice xmlns:a14="http://schemas.microsoft.com/office/drawing/2010/main" Requires="a14">
+      <mc:AlternateContent xmlns:mc="http://schemas.openxmlformats.org/markup-compatibility/2006" xmlns:a14="http://schemas.microsoft.com/office/drawing/2010/main">
+        <mc:Choice Requires="a14">
           <p:sp>
             <p:nvSpPr>
               <p:cNvPr id="3" name="Content Placeholder 2">
@@ -5345,7 +5345,7 @@
                     <m:d>
                       <m:dPr>
                         <m:ctrlPr>
-                          <a:rPr lang="en-US" sz="2000" b="0" i="0" smtClean="0">
+                          <a:rPr lang="en-US" sz="2000" b="0" i="1" smtClean="0">
                             <a:latin typeface="Cambria Math" panose="02040503050406030204" pitchFamily="18" charset="0"/>
                           </a:rPr>
                         </m:ctrlPr>
@@ -5365,7 +5365,7 @@
                             <m:begChr m:val="["/>
                             <m:endChr m:val="]"/>
                             <m:ctrlPr>
-                              <a:rPr lang="en-US" sz="2000" b="0" i="0" smtClean="0">
+                              <a:rPr lang="en-US" sz="2000" b="0" i="1" smtClean="0">
                                 <a:latin typeface="Cambria Math" panose="02040503050406030204" pitchFamily="18" charset="0"/>
                               </a:rPr>
                             </m:ctrlPr>
@@ -5613,7 +5613,7 @@
             </p:txBody>
           </p:sp>
         </mc:Choice>
-        <mc:Fallback>
+        <mc:Fallback xmlns="">
           <p:sp>
             <p:nvSpPr>
               <p:cNvPr id="3" name="Content Placeholder 2">
@@ -5686,8 +5686,8 @@
           </a:p>
         </p:txBody>
       </p:sp>
-      <mc:AlternateContent xmlns:mc="http://schemas.openxmlformats.org/markup-compatibility/2006">
-        <mc:Choice xmlns:a14="http://schemas.microsoft.com/office/drawing/2010/main" Requires="a14">
+      <mc:AlternateContent xmlns:mc="http://schemas.openxmlformats.org/markup-compatibility/2006" xmlns:a14="http://schemas.microsoft.com/office/drawing/2010/main">
+        <mc:Choice Requires="a14">
           <p:graphicFrame>
             <p:nvGraphicFramePr>
               <p:cNvPr id="5" name="Table 4">
@@ -5754,6 +5754,7 @@
                         <a:bodyPr/>
                         <a:lstStyle/>
                         <a:p>
+                          <a:pPr/>
                           <a14:m>
                             <m:oMathPara xmlns:m="http://schemas.openxmlformats.org/officeDocument/2006/math">
                               <m:oMathParaPr>
@@ -5803,6 +5804,7 @@
                         <a:bodyPr/>
                         <a:lstStyle/>
                         <a:p>
+                          <a:pPr/>
                           <a14:m>
                             <m:oMathPara xmlns:m="http://schemas.openxmlformats.org/officeDocument/2006/math">
                               <m:oMathParaPr>
@@ -5843,6 +5845,7 @@
                         <a:bodyPr/>
                         <a:lstStyle/>
                         <a:p>
+                          <a:pPr/>
                           <a14:m>
                             <m:oMathPara xmlns:m="http://schemas.openxmlformats.org/officeDocument/2006/math">
                               <m:oMathParaPr>
@@ -6464,7 +6467,7 @@
             </a:graphic>
           </p:graphicFrame>
         </mc:Choice>
-        <mc:Fallback>
+        <mc:Fallback xmlns="">
           <p:graphicFrame>
             <p:nvGraphicFramePr>
               <p:cNvPr id="5" name="Table 4">
@@ -7254,8 +7257,8 @@
           </a:p>
         </p:txBody>
       </p:sp>
-      <mc:AlternateContent xmlns:mc="http://schemas.openxmlformats.org/markup-compatibility/2006">
-        <mc:Choice xmlns:a14="http://schemas.microsoft.com/office/drawing/2010/main" Requires="a14">
+      <mc:AlternateContent xmlns:mc="http://schemas.openxmlformats.org/markup-compatibility/2006" xmlns:a14="http://schemas.microsoft.com/office/drawing/2010/main">
+        <mc:Choice Requires="a14">
           <p:sp>
             <p:nvSpPr>
               <p:cNvPr id="3" name="Content Placeholder 2">
@@ -7714,7 +7717,7 @@
             </p:txBody>
           </p:sp>
         </mc:Choice>
-        <mc:Fallback>
+        <mc:Fallback xmlns="">
           <p:sp>
             <p:nvSpPr>
               <p:cNvPr id="3" name="Content Placeholder 2">
@@ -7841,8 +7844,8 @@
           </a:p>
         </p:txBody>
       </p:sp>
-      <mc:AlternateContent xmlns:mc="http://schemas.openxmlformats.org/markup-compatibility/2006">
-        <mc:Choice xmlns:a14="http://schemas.microsoft.com/office/drawing/2010/main" Requires="a14">
+      <mc:AlternateContent xmlns:mc="http://schemas.openxmlformats.org/markup-compatibility/2006" xmlns:a14="http://schemas.microsoft.com/office/drawing/2010/main">
+        <mc:Choice Requires="a14">
           <p:sp>
             <p:nvSpPr>
               <p:cNvPr id="3" name="Content Placeholder 2">
@@ -8288,7 +8291,7 @@
                         <m:begChr m:val="["/>
                         <m:endChr m:val="]"/>
                         <m:ctrlPr>
-                          <a:rPr lang="en-US" sz="2000" b="0" i="0" smtClean="0">
+                          <a:rPr lang="en-US" sz="2000" b="0" i="1" smtClean="0">
                             <a:latin typeface="Cambria Math" panose="02040503050406030204" pitchFamily="18" charset="0"/>
                           </a:rPr>
                         </m:ctrlPr>
@@ -8392,7 +8395,7 @@
             </p:txBody>
           </p:sp>
         </mc:Choice>
-        <mc:Fallback>
+        <mc:Fallback xmlns="">
           <p:sp>
             <p:nvSpPr>
               <p:cNvPr id="3" name="Content Placeholder 2">
@@ -8519,8 +8522,8 @@
           </a:p>
         </p:txBody>
       </p:sp>
-      <mc:AlternateContent xmlns:mc="http://schemas.openxmlformats.org/markup-compatibility/2006">
-        <mc:Choice xmlns:a14="http://schemas.microsoft.com/office/drawing/2010/main" Requires="a14">
+      <mc:AlternateContent xmlns:mc="http://schemas.openxmlformats.org/markup-compatibility/2006" xmlns:a14="http://schemas.microsoft.com/office/drawing/2010/main">
+        <mc:Choice Requires="a14">
           <p:sp>
             <p:nvSpPr>
               <p:cNvPr id="3" name="Content Placeholder 2">
@@ -8808,7 +8811,7 @@
             </p:txBody>
           </p:sp>
         </mc:Choice>
-        <mc:Fallback>
+        <mc:Fallback xmlns="">
           <p:sp>
             <p:nvSpPr>
               <p:cNvPr id="3" name="Content Placeholder 2">
@@ -8926,8 +8929,8 @@
           </a:p>
         </p:txBody>
       </p:sp>
-      <mc:AlternateContent xmlns:mc="http://schemas.openxmlformats.org/markup-compatibility/2006">
-        <mc:Choice xmlns:a14="http://schemas.microsoft.com/office/drawing/2010/main" Requires="a14">
+      <mc:AlternateContent xmlns:mc="http://schemas.openxmlformats.org/markup-compatibility/2006" xmlns:a14="http://schemas.microsoft.com/office/drawing/2010/main">
+        <mc:Choice Requires="a14">
           <p:sp>
             <p:nvSpPr>
               <p:cNvPr id="6" name="TextBox 5">
@@ -8987,7 +8990,7 @@
             </p:txBody>
           </p:sp>
         </mc:Choice>
-        <mc:Fallback>
+        <mc:Fallback xmlns="">
           <p:sp>
             <p:nvSpPr>
               <p:cNvPr id="6" name="TextBox 5">
@@ -9088,8 +9091,8 @@
           </a:p>
         </p:txBody>
       </p:sp>
-      <mc:AlternateContent xmlns:mc="http://schemas.openxmlformats.org/markup-compatibility/2006">
-        <mc:Choice xmlns:a14="http://schemas.microsoft.com/office/drawing/2010/main" Requires="a14">
+      <mc:AlternateContent xmlns:mc="http://schemas.openxmlformats.org/markup-compatibility/2006" xmlns:a14="http://schemas.microsoft.com/office/drawing/2010/main">
+        <mc:Choice Requires="a14">
           <p:sp>
             <p:nvSpPr>
               <p:cNvPr id="8" name="TextBox 7">
@@ -9158,7 +9161,7 @@
             </p:txBody>
           </p:sp>
         </mc:Choice>
-        <mc:Fallback>
+        <mc:Fallback xmlns="">
           <p:sp>
             <p:nvSpPr>
               <p:cNvPr id="8" name="TextBox 7">
@@ -9203,8 +9206,8 @@
           </p:sp>
         </mc:Fallback>
       </mc:AlternateContent>
-      <mc:AlternateContent xmlns:mc="http://schemas.openxmlformats.org/markup-compatibility/2006">
-        <mc:Choice xmlns:a14="http://schemas.microsoft.com/office/drawing/2010/main" Requires="a14">
+      <mc:AlternateContent xmlns:mc="http://schemas.openxmlformats.org/markup-compatibility/2006" xmlns:a14="http://schemas.microsoft.com/office/drawing/2010/main">
+        <mc:Choice Requires="a14">
           <p:sp>
             <p:nvSpPr>
               <p:cNvPr id="9" name="TextBox 8">
@@ -9264,7 +9267,7 @@
             </p:txBody>
           </p:sp>
         </mc:Choice>
-        <mc:Fallback>
+        <mc:Fallback xmlns="">
           <p:sp>
             <p:nvSpPr>
               <p:cNvPr id="9" name="TextBox 8">
@@ -9596,8 +9599,8 @@
           </a:fontRef>
         </p:style>
       </p:cxnSp>
-      <mc:AlternateContent xmlns:mc="http://schemas.openxmlformats.org/markup-compatibility/2006">
-        <mc:Choice xmlns:a14="http://schemas.microsoft.com/office/drawing/2010/main" Requires="a14">
+      <mc:AlternateContent xmlns:mc="http://schemas.openxmlformats.org/markup-compatibility/2006" xmlns:a14="http://schemas.microsoft.com/office/drawing/2010/main">
+        <mc:Choice Requires="a14">
           <p:sp>
             <p:nvSpPr>
               <p:cNvPr id="55" name="TextBox 54">
@@ -9677,7 +9680,7 @@
             </p:txBody>
           </p:sp>
         </mc:Choice>
-        <mc:Fallback>
+        <mc:Fallback xmlns="">
           <p:sp>
             <p:nvSpPr>
               <p:cNvPr id="55" name="TextBox 54">
@@ -10006,8 +10009,8 @@
           </a:p>
         </p:txBody>
       </p:sp>
-      <mc:AlternateContent xmlns:mc="http://schemas.openxmlformats.org/markup-compatibility/2006">
-        <mc:Choice xmlns:a14="http://schemas.microsoft.com/office/drawing/2010/main" Requires="a14">
+      <mc:AlternateContent xmlns:mc="http://schemas.openxmlformats.org/markup-compatibility/2006" xmlns:a14="http://schemas.microsoft.com/office/drawing/2010/main">
+        <mc:Choice Requires="a14">
           <p:sp>
             <p:nvSpPr>
               <p:cNvPr id="6" name="TextBox 5">
@@ -10067,7 +10070,7 @@
             </p:txBody>
           </p:sp>
         </mc:Choice>
-        <mc:Fallback>
+        <mc:Fallback xmlns="">
           <p:sp>
             <p:nvSpPr>
               <p:cNvPr id="6" name="TextBox 5">
@@ -10168,8 +10171,8 @@
           </a:p>
         </p:txBody>
       </p:sp>
-      <mc:AlternateContent xmlns:mc="http://schemas.openxmlformats.org/markup-compatibility/2006">
-        <mc:Choice xmlns:a14="http://schemas.microsoft.com/office/drawing/2010/main" Requires="a14">
+      <mc:AlternateContent xmlns:mc="http://schemas.openxmlformats.org/markup-compatibility/2006" xmlns:a14="http://schemas.microsoft.com/office/drawing/2010/main">
+        <mc:Choice Requires="a14">
           <p:sp>
             <p:nvSpPr>
               <p:cNvPr id="8" name="TextBox 7">
@@ -10238,7 +10241,7 @@
             </p:txBody>
           </p:sp>
         </mc:Choice>
-        <mc:Fallback>
+        <mc:Fallback xmlns="">
           <p:sp>
             <p:nvSpPr>
               <p:cNvPr id="8" name="TextBox 7">
@@ -10283,8 +10286,8 @@
           </p:sp>
         </mc:Fallback>
       </mc:AlternateContent>
-      <mc:AlternateContent xmlns:mc="http://schemas.openxmlformats.org/markup-compatibility/2006">
-        <mc:Choice xmlns:a14="http://schemas.microsoft.com/office/drawing/2010/main" Requires="a14">
+      <mc:AlternateContent xmlns:mc="http://schemas.openxmlformats.org/markup-compatibility/2006" xmlns:a14="http://schemas.microsoft.com/office/drawing/2010/main">
+        <mc:Choice Requires="a14">
           <p:sp>
             <p:nvSpPr>
               <p:cNvPr id="9" name="TextBox 8">
@@ -10344,7 +10347,7 @@
             </p:txBody>
           </p:sp>
         </mc:Choice>
-        <mc:Fallback>
+        <mc:Fallback xmlns="">
           <p:sp>
             <p:nvSpPr>
               <p:cNvPr id="9" name="TextBox 8">
@@ -10676,8 +10679,8 @@
           </a:fontRef>
         </p:style>
       </p:cxnSp>
-      <mc:AlternateContent xmlns:mc="http://schemas.openxmlformats.org/markup-compatibility/2006">
-        <mc:Choice xmlns:a14="http://schemas.microsoft.com/office/drawing/2010/main" Requires="a14">
+      <mc:AlternateContent xmlns:mc="http://schemas.openxmlformats.org/markup-compatibility/2006" xmlns:a14="http://schemas.microsoft.com/office/drawing/2010/main">
+        <mc:Choice Requires="a14">
           <p:sp>
             <p:nvSpPr>
               <p:cNvPr id="55" name="TextBox 54">
@@ -10757,7 +10760,7 @@
             </p:txBody>
           </p:sp>
         </mc:Choice>
-        <mc:Fallback>
+        <mc:Fallback xmlns="">
           <p:sp>
             <p:nvSpPr>
               <p:cNvPr id="55" name="TextBox 54">
@@ -11706,8 +11709,8 @@
           </a:p>
         </p:txBody>
       </p:sp>
-      <mc:AlternateContent xmlns:mc="http://schemas.openxmlformats.org/markup-compatibility/2006">
-        <mc:Choice xmlns:a14="http://schemas.microsoft.com/office/drawing/2010/main" Requires="a14">
+      <mc:AlternateContent xmlns:mc="http://schemas.openxmlformats.org/markup-compatibility/2006" xmlns:a14="http://schemas.microsoft.com/office/drawing/2010/main">
+        <mc:Choice Requires="a14">
           <p:sp>
             <p:nvSpPr>
               <p:cNvPr id="3" name="Content Placeholder 2">
@@ -11922,7 +11925,7 @@
             </p:txBody>
           </p:sp>
         </mc:Choice>
-        <mc:Fallback>
+        <mc:Fallback xmlns="">
           <p:sp>
             <p:nvSpPr>
               <p:cNvPr id="3" name="Content Placeholder 2">
@@ -12025,8 +12028,8 @@
           </a:prstGeom>
         </p:spPr>
       </p:pic>
-      <mc:AlternateContent xmlns:mc="http://schemas.openxmlformats.org/markup-compatibility/2006">
-        <mc:Choice xmlns:a14="http://schemas.microsoft.com/office/drawing/2010/main" Requires="a14">
+      <mc:AlternateContent xmlns:mc="http://schemas.openxmlformats.org/markup-compatibility/2006" xmlns:a14="http://schemas.microsoft.com/office/drawing/2010/main">
+        <mc:Choice Requires="a14">
           <p:sp>
             <p:nvSpPr>
               <p:cNvPr id="7" name="Rectangle: Rounded Corners 6">
@@ -12177,7 +12180,7 @@
             </p:txBody>
           </p:sp>
         </mc:Choice>
-        <mc:Fallback>
+        <mc:Fallback xmlns="">
           <p:sp>
             <p:nvSpPr>
               <p:cNvPr id="7" name="Rectangle: Rounded Corners 6">
@@ -14122,8 +14125,8 @@
           </a:p>
         </p:txBody>
       </p:sp>
-      <mc:AlternateContent xmlns:mc="http://schemas.openxmlformats.org/markup-compatibility/2006">
-        <mc:Choice xmlns:a14="http://schemas.microsoft.com/office/drawing/2010/main" Requires="a14">
+      <mc:AlternateContent xmlns:mc="http://schemas.openxmlformats.org/markup-compatibility/2006" xmlns:a14="http://schemas.microsoft.com/office/drawing/2010/main">
+        <mc:Choice Requires="a14">
           <p:sp>
             <p:nvSpPr>
               <p:cNvPr id="3" name="Content Placeholder 2">
@@ -14220,7 +14223,7 @@
             </p:txBody>
           </p:sp>
         </mc:Choice>
-        <mc:Fallback>
+        <mc:Fallback xmlns="">
           <p:sp>
             <p:nvSpPr>
               <p:cNvPr id="3" name="Content Placeholder 2">
@@ -14319,8 +14322,8 @@
           </a:prstGeom>
         </p:spPr>
       </p:pic>
-      <mc:AlternateContent xmlns:mc="http://schemas.openxmlformats.org/markup-compatibility/2006">
-        <mc:Choice xmlns:a14="http://schemas.microsoft.com/office/drawing/2010/main" Requires="a14">
+      <mc:AlternateContent xmlns:mc="http://schemas.openxmlformats.org/markup-compatibility/2006" xmlns:a14="http://schemas.microsoft.com/office/drawing/2010/main">
+        <mc:Choice Requires="a14">
           <p:sp>
             <p:nvSpPr>
               <p:cNvPr id="7" name="TextBox 6">
@@ -14719,7 +14722,7 @@
             </p:txBody>
           </p:sp>
         </mc:Choice>
-        <mc:Fallback>
+        <mc:Fallback xmlns="">
           <p:sp>
             <p:nvSpPr>
               <p:cNvPr id="7" name="TextBox 6">
@@ -14813,8 +14816,8 @@
           </a:p>
         </p:txBody>
       </p:sp>
-      <mc:AlternateContent xmlns:mc="http://schemas.openxmlformats.org/markup-compatibility/2006">
-        <mc:Choice xmlns:a14="http://schemas.microsoft.com/office/drawing/2010/main" Requires="a14">
+      <mc:AlternateContent xmlns:mc="http://schemas.openxmlformats.org/markup-compatibility/2006" xmlns:a14="http://schemas.microsoft.com/office/drawing/2010/main">
+        <mc:Choice Requires="a14">
           <p:graphicFrame>
             <p:nvGraphicFramePr>
               <p:cNvPr id="5" name="Table 4">
@@ -14874,6 +14877,7 @@
                         <a:bodyPr/>
                         <a:lstStyle/>
                         <a:p>
+                          <a:pPr/>
                           <a14:m>
                             <m:oMathPara xmlns:m="http://schemas.openxmlformats.org/officeDocument/2006/math">
                               <m:oMathParaPr>
@@ -14899,6 +14903,7 @@
                         <a:bodyPr/>
                         <a:lstStyle/>
                         <a:p>
+                          <a:pPr/>
                           <a14:m>
                             <m:oMathPara xmlns:m="http://schemas.openxmlformats.org/officeDocument/2006/math">
                               <m:oMathParaPr>
@@ -14942,6 +14947,7 @@
                         <a:bodyPr/>
                         <a:lstStyle/>
                         <a:p>
+                          <a:pPr/>
                           <a14:m>
                             <m:oMathPara xmlns:m="http://schemas.openxmlformats.org/officeDocument/2006/math">
                               <m:oMathParaPr>
@@ -15267,7 +15273,7 @@
             </a:graphic>
           </p:graphicFrame>
         </mc:Choice>
-        <mc:Fallback>
+        <mc:Fallback xmlns="">
           <p:graphicFrame>
             <p:nvGraphicFramePr>
               <p:cNvPr id="5" name="Table 4">
@@ -16402,8 +16408,8 @@
           </a:p>
         </p:txBody>
       </p:sp>
-      <mc:AlternateContent xmlns:mc="http://schemas.openxmlformats.org/markup-compatibility/2006">
-        <mc:Choice xmlns:a14="http://schemas.microsoft.com/office/drawing/2010/main" Requires="a14">
+      <mc:AlternateContent xmlns:mc="http://schemas.openxmlformats.org/markup-compatibility/2006" xmlns:a14="http://schemas.microsoft.com/office/drawing/2010/main">
+        <mc:Choice Requires="a14">
           <p:sp>
             <p:nvSpPr>
               <p:cNvPr id="3" name="Content Placeholder 2">
@@ -16669,7 +16675,7 @@
             </p:txBody>
           </p:sp>
         </mc:Choice>
-        <mc:Fallback>
+        <mc:Fallback xmlns="">
           <p:sp>
             <p:nvSpPr>
               <p:cNvPr id="3" name="Content Placeholder 2">
@@ -17592,8 +17598,8 @@
           </a:p>
         </p:txBody>
       </p:sp>
-      <mc:AlternateContent xmlns:mc="http://schemas.openxmlformats.org/markup-compatibility/2006">
-        <mc:Choice xmlns:a14="http://schemas.microsoft.com/office/drawing/2010/main" Requires="a14">
+      <mc:AlternateContent xmlns:mc="http://schemas.openxmlformats.org/markup-compatibility/2006" xmlns:a14="http://schemas.microsoft.com/office/drawing/2010/main">
+        <mc:Choice Requires="a14">
           <p:sp>
             <p:nvSpPr>
               <p:cNvPr id="3" name="Content Placeholder 2">
@@ -18601,7 +18607,7 @@
             </p:txBody>
           </p:sp>
         </mc:Choice>
-        <mc:Fallback>
+        <mc:Fallback xmlns="">
           <p:sp>
             <p:nvSpPr>
               <p:cNvPr id="3" name="Content Placeholder 2">
@@ -19230,8 +19236,8 @@
           </a:p>
         </p:txBody>
       </p:sp>
-      <mc:AlternateContent xmlns:mc="http://schemas.openxmlformats.org/markup-compatibility/2006">
-        <mc:Choice xmlns:a14="http://schemas.microsoft.com/office/drawing/2010/main" Requires="a14">
+      <mc:AlternateContent xmlns:mc="http://schemas.openxmlformats.org/markup-compatibility/2006" xmlns:a14="http://schemas.microsoft.com/office/drawing/2010/main">
+        <mc:Choice Requires="a14">
           <p:sp>
             <p:nvSpPr>
               <p:cNvPr id="3" name="Content Placeholder 2">
@@ -19429,7 +19435,7 @@
             </p:txBody>
           </p:sp>
         </mc:Choice>
-        <mc:Fallback>
+        <mc:Fallback xmlns="">
           <p:sp>
             <p:nvSpPr>
               <p:cNvPr id="3" name="Content Placeholder 2">
@@ -19879,8 +19885,8 @@
           </a:p>
         </p:txBody>
       </p:sp>
-      <mc:AlternateContent xmlns:mc="http://schemas.openxmlformats.org/markup-compatibility/2006">
-        <mc:Choice xmlns:a14="http://schemas.microsoft.com/office/drawing/2010/main" Requires="a14">
+      <mc:AlternateContent xmlns:mc="http://schemas.openxmlformats.org/markup-compatibility/2006" xmlns:a14="http://schemas.microsoft.com/office/drawing/2010/main">
+        <mc:Choice Requires="a14">
           <p:sp>
             <p:nvSpPr>
               <p:cNvPr id="3" name="Content Placeholder 2">
@@ -20720,7 +20726,7 @@
             </p:txBody>
           </p:sp>
         </mc:Choice>
-        <mc:Fallback>
+        <mc:Fallback xmlns="">
           <p:sp>
             <p:nvSpPr>
               <p:cNvPr id="3" name="Content Placeholder 2">
@@ -21848,8 +21854,8 @@
           </a:p>
         </p:txBody>
       </p:sp>
-      <mc:AlternateContent xmlns:mc="http://schemas.openxmlformats.org/markup-compatibility/2006">
-        <mc:Choice xmlns:a14="http://schemas.microsoft.com/office/drawing/2010/main" Requires="a14">
+      <mc:AlternateContent xmlns:mc="http://schemas.openxmlformats.org/markup-compatibility/2006" xmlns:a14="http://schemas.microsoft.com/office/drawing/2010/main">
+        <mc:Choice Requires="a14">
           <p:sp>
             <p:nvSpPr>
               <p:cNvPr id="3" name="Content Placeholder 2">
@@ -21921,7 +21927,7 @@
             </p:txBody>
           </p:sp>
         </mc:Choice>
-        <mc:Fallback>
+        <mc:Fallback xmlns="">
           <p:sp>
             <p:nvSpPr>
               <p:cNvPr id="3" name="Content Placeholder 2">
@@ -23490,8 +23496,8 @@
           </a:fontRef>
         </p:style>
       </p:cxnSp>
-      <mc:AlternateContent xmlns:mc="http://schemas.openxmlformats.org/markup-compatibility/2006">
-        <mc:Choice xmlns:a14="http://schemas.microsoft.com/office/drawing/2010/main" Requires="a14">
+      <mc:AlternateContent xmlns:mc="http://schemas.openxmlformats.org/markup-compatibility/2006" xmlns:a14="http://schemas.microsoft.com/office/drawing/2010/main">
+        <mc:Choice Requires="a14">
           <p:sp>
             <p:nvSpPr>
               <p:cNvPr id="10" name="TextBox 9">
@@ -23569,7 +23575,7 @@
             </p:txBody>
           </p:sp>
         </mc:Choice>
-        <mc:Fallback>
+        <mc:Fallback xmlns="">
           <p:sp>
             <p:nvSpPr>
               <p:cNvPr id="10" name="TextBox 9">
@@ -23614,8 +23620,8 @@
           </p:sp>
         </mc:Fallback>
       </mc:AlternateContent>
-      <mc:AlternateContent xmlns:mc="http://schemas.openxmlformats.org/markup-compatibility/2006">
-        <mc:Choice xmlns:a14="http://schemas.microsoft.com/office/drawing/2010/main" Requires="a14">
+      <mc:AlternateContent xmlns:mc="http://schemas.openxmlformats.org/markup-compatibility/2006" xmlns:a14="http://schemas.microsoft.com/office/drawing/2010/main">
+        <mc:Choice Requires="a14">
           <p:sp>
             <p:nvSpPr>
               <p:cNvPr id="12" name="TextBox 11">
@@ -23669,7 +23675,7 @@
             </p:txBody>
           </p:sp>
         </mc:Choice>
-        <mc:Fallback>
+        <mc:Fallback xmlns="">
           <p:sp>
             <p:nvSpPr>
               <p:cNvPr id="12" name="TextBox 11">
@@ -24230,8 +24236,8 @@
           </a:fontRef>
         </p:style>
       </p:cxnSp>
-      <mc:AlternateContent xmlns:mc="http://schemas.openxmlformats.org/markup-compatibility/2006">
-        <mc:Choice xmlns:a14="http://schemas.microsoft.com/office/drawing/2010/main" Requires="a14">
+      <mc:AlternateContent xmlns:mc="http://schemas.openxmlformats.org/markup-compatibility/2006" xmlns:a14="http://schemas.microsoft.com/office/drawing/2010/main">
+        <mc:Choice Requires="a14">
           <p:sp>
             <p:nvSpPr>
               <p:cNvPr id="14" name="TextBox 13">
@@ -24309,7 +24315,7 @@
             </p:txBody>
           </p:sp>
         </mc:Choice>
-        <mc:Fallback>
+        <mc:Fallback xmlns="">
           <p:sp>
             <p:nvSpPr>
               <p:cNvPr id="14" name="TextBox 13">
@@ -24354,8 +24360,8 @@
           </p:sp>
         </mc:Fallback>
       </mc:AlternateContent>
-      <mc:AlternateContent xmlns:mc="http://schemas.openxmlformats.org/markup-compatibility/2006">
-        <mc:Choice xmlns:a14="http://schemas.microsoft.com/office/drawing/2010/main" Requires="a14">
+      <mc:AlternateContent xmlns:mc="http://schemas.openxmlformats.org/markup-compatibility/2006" xmlns:a14="http://schemas.microsoft.com/office/drawing/2010/main">
+        <mc:Choice Requires="a14">
           <p:sp>
             <p:nvSpPr>
               <p:cNvPr id="15" name="TextBox 14">
@@ -24409,7 +24415,7 @@
             </p:txBody>
           </p:sp>
         </mc:Choice>
-        <mc:Fallback>
+        <mc:Fallback xmlns="">
           <p:sp>
             <p:nvSpPr>
               <p:cNvPr id="15" name="TextBox 14">

</xml_diff>